<commit_message>
Chapter 7 and Pdf report from Chapter 5
Signed-off-by: developersview <pcslg1998@gmail.com>
</commit_message>
<xml_diff>
--- a/_3_Learning Data Analytics Part 2 Extending and Apply/Ch07/SalesDashboard_Production_Start.pptx
+++ b/_3_Learning Data Analytics Part 2 Extending and Apply/Ch07/SalesDashboard_Production_Start.pptx
@@ -5,11 +5,12 @@
     <p:sldMasterId id="2147483660" r:id="rId1"/>
   </p:sldMasterIdLst>
   <p:notesMasterIdLst>
-    <p:notesMasterId r:id="rId4"/>
+    <p:notesMasterId r:id="rId5"/>
   </p:notesMasterIdLst>
   <p:sldIdLst>
     <p:sldId id="256" r:id="rId2"/>
     <p:sldId id="257" r:id="rId3"/>
+    <p:sldId id="258" r:id="rId4"/>
   </p:sldIdLst>
   <p:sldSz cx="12192000" cy="6858000"/>
   <p:notesSz cx="6858000" cy="9144000"/>
@@ -198,7 +199,7 @@
           <a:p>
             <a:fld id="{612157D5-D3EF-4C20-885D-D5AF9087E8DE}" type="datetimeFigureOut">
               <a:rPr lang="en-US" smtClean="0"/>
-              <a:t>2/16/2021</a:t>
+              <a:t>6/2/2024</a:t>
             </a:fld>
             <a:endParaRPr lang="en-US"/>
           </a:p>
@@ -659,6 +660,205 @@
 </p:notes>
 </file>
 
+<file path=ppt/notesSlides/notesSlide2.xml><?xml version="1.0" encoding="utf-8"?>
+<p:notes xmlns:a="http://schemas.openxmlformats.org/drawingml/2006/main" xmlns:r="http://schemas.openxmlformats.org/officeDocument/2006/relationships" xmlns:p="http://schemas.openxmlformats.org/presentationml/2006/main">
+  <p:cSld>
+    <p:spTree>
+      <p:nvGrpSpPr>
+        <p:cNvPr id="1" name=""/>
+        <p:cNvGrpSpPr/>
+        <p:nvPr/>
+      </p:nvGrpSpPr>
+      <p:grpSpPr>
+        <a:xfrm>
+          <a:off x="0" y="0"/>
+          <a:ext cx="0" cy="0"/>
+          <a:chOff x="0" y="0"/>
+          <a:chExt cx="0" cy="0"/>
+        </a:xfrm>
+      </p:grpSpPr>
+      <p:sp>
+        <p:nvSpPr>
+          <p:cNvPr id="2" name="Slide Text"/>
+          <p:cNvSpPr>
+            <a:spLocks noGrp="1"/>
+          </p:cNvSpPr>
+          <p:nvPr>
+            <p:ph type="body" idx="1"/>
+          </p:nvPr>
+        </p:nvSpPr>
+        <p:spPr/>
+        <p:txBody>
+          <a:bodyPr/>
+          <a:lstStyle/>
+          <a:p>
+            <a:r>
+              <a:rPr b="1" dirty="0"/>
+              <a:t>lineChart</a:t>
+            </a:r>
+            <a:endParaRPr dirty="0"/>
+          </a:p>
+          <a:p>
+            <a:r>
+              <a:rPr b="0" dirty="0"/>
+              <a:t>No alt text provided.</a:t>
+            </a:r>
+            <a:endParaRPr dirty="0"/>
+          </a:p>
+          <a:p>
+            <a:endParaRPr dirty="0"/>
+          </a:p>
+          <a:p>
+            <a:r>
+              <a:rPr b="1" dirty="0"/>
+              <a:t>lineChart</a:t>
+            </a:r>
+            <a:endParaRPr dirty="0"/>
+          </a:p>
+          <a:p>
+            <a:r>
+              <a:rPr b="0" dirty="0"/>
+              <a:t>No alt text provided.</a:t>
+            </a:r>
+            <a:endParaRPr dirty="0"/>
+          </a:p>
+          <a:p>
+            <a:endParaRPr dirty="0"/>
+          </a:p>
+          <a:p>
+            <a:r>
+              <a:rPr b="1" dirty="0"/>
+              <a:t>lineChart</a:t>
+            </a:r>
+            <a:endParaRPr dirty="0"/>
+          </a:p>
+          <a:p>
+            <a:r>
+              <a:rPr b="0" dirty="0"/>
+              <a:t>No alt text provided.</a:t>
+            </a:r>
+            <a:endParaRPr dirty="0"/>
+          </a:p>
+          <a:p>
+            <a:endParaRPr dirty="0"/>
+          </a:p>
+          <a:p>
+            <a:r>
+              <a:rPr b="1" dirty="0"/>
+              <a:t>multiRowCard</a:t>
+            </a:r>
+            <a:endParaRPr dirty="0"/>
+          </a:p>
+          <a:p>
+            <a:r>
+              <a:rPr b="0" dirty="0"/>
+              <a:t>No alt text provided.</a:t>
+            </a:r>
+            <a:endParaRPr dirty="0"/>
+          </a:p>
+          <a:p>
+            <a:endParaRPr dirty="0"/>
+          </a:p>
+          <a:p>
+            <a:r>
+              <a:rPr b="1" dirty="0"/>
+              <a:t>Total Delivered</a:t>
+            </a:r>
+            <a:endParaRPr dirty="0"/>
+          </a:p>
+          <a:p>
+            <a:r>
+              <a:rPr b="0" dirty="0"/>
+              <a:t>No alt text provided.</a:t>
+            </a:r>
+            <a:endParaRPr dirty="0"/>
+          </a:p>
+          <a:p>
+            <a:endParaRPr dirty="0"/>
+          </a:p>
+          <a:p>
+            <a:r>
+              <a:rPr b="1" dirty="0"/>
+              <a:t>Total Lost Orders</a:t>
+            </a:r>
+            <a:endParaRPr dirty="0"/>
+          </a:p>
+          <a:p>
+            <a:r>
+              <a:rPr b="0" dirty="0"/>
+              <a:t>No alt text provided.</a:t>
+            </a:r>
+            <a:endParaRPr dirty="0"/>
+          </a:p>
+          <a:p>
+            <a:endParaRPr dirty="0"/>
+          </a:p>
+          <a:p>
+            <a:r>
+              <a:rPr b="1" dirty="0"/>
+              <a:t>Total Returned</a:t>
+            </a:r>
+            <a:endParaRPr dirty="0"/>
+          </a:p>
+          <a:p>
+            <a:r>
+              <a:rPr b="0" dirty="0"/>
+              <a:t>No alt text provided.</a:t>
+            </a:r>
+            <a:endParaRPr dirty="0"/>
+          </a:p>
+          <a:p>
+            <a:endParaRPr dirty="0"/>
+          </a:p>
+          <a:p>
+            <a:r>
+              <a:rPr b="1" dirty="0"/>
+              <a:t>Total Back Ordered</a:t>
+            </a:r>
+            <a:endParaRPr dirty="0"/>
+          </a:p>
+          <a:p>
+            <a:r>
+              <a:rPr b="0" dirty="0"/>
+              <a:t>No alt text provided.</a:t>
+            </a:r>
+            <a:endParaRPr dirty="0"/>
+          </a:p>
+          <a:p>
+            <a:endParaRPr dirty="0"/>
+          </a:p>
+          <a:p>
+            <a:r>
+              <a:rPr b="1" dirty="0"/>
+              <a:t>slicer</a:t>
+            </a:r>
+            <a:endParaRPr dirty="0"/>
+          </a:p>
+          <a:p>
+            <a:r>
+              <a:rPr b="0" dirty="0"/>
+              <a:t>No alt text provided.</a:t>
+            </a:r>
+            <a:endParaRPr dirty="0"/>
+          </a:p>
+          <a:p>
+            <a:endParaRPr dirty="0"/>
+          </a:p>
+        </p:txBody>
+      </p:sp>
+    </p:spTree>
+    <p:extLst>
+      <p:ext uri="{BB962C8B-B14F-4D97-AF65-F5344CB8AC3E}">
+        <p14:creationId xmlns:p14="http://schemas.microsoft.com/office/powerpoint/2010/main" val="944856600"/>
+      </p:ext>
+    </p:extLst>
+  </p:cSld>
+  <p:clrMapOvr>
+    <a:masterClrMapping/>
+  </p:clrMapOvr>
+</p:notes>
+</file>
+
 <file path=ppt/slideLayouts/slideLayout1.xml><?xml version="1.0" encoding="utf-8"?>
 <p:sldLayout xmlns:a="http://schemas.openxmlformats.org/drawingml/2006/main" xmlns:r="http://schemas.openxmlformats.org/officeDocument/2006/relationships" xmlns:p="http://schemas.openxmlformats.org/presentationml/2006/main" type="title" preserve="1">
   <p:cSld name="Title Slide">
@@ -788,7 +988,7 @@
           <a:p>
             <a:fld id="{627ED9C8-F09A-4D9E-BEC0-4725162E21FF}" type="datetimeFigureOut">
               <a:rPr lang="en-US" smtClean="0"/>
-              <a:t>2/16/2021</a:t>
+              <a:t>6/2/2024</a:t>
             </a:fld>
             <a:endParaRPr lang="en-US"/>
           </a:p>
@@ -956,7 +1156,7 @@
           <a:p>
             <a:fld id="{627ED9C8-F09A-4D9E-BEC0-4725162E21FF}" type="datetimeFigureOut">
               <a:rPr lang="en-US" smtClean="0"/>
-              <a:t>2/16/2021</a:t>
+              <a:t>6/2/2024</a:t>
             </a:fld>
             <a:endParaRPr lang="en-US"/>
           </a:p>
@@ -1134,7 +1334,7 @@
           <a:p>
             <a:fld id="{627ED9C8-F09A-4D9E-BEC0-4725162E21FF}" type="datetimeFigureOut">
               <a:rPr lang="en-US" smtClean="0"/>
-              <a:t>2/16/2021</a:t>
+              <a:t>6/2/2024</a:t>
             </a:fld>
             <a:endParaRPr lang="en-US"/>
           </a:p>
@@ -1302,7 +1502,7 @@
           <a:p>
             <a:fld id="{627ED9C8-F09A-4D9E-BEC0-4725162E21FF}" type="datetimeFigureOut">
               <a:rPr lang="en-US" smtClean="0"/>
-              <a:t>2/16/2021</a:t>
+              <a:t>6/2/2024</a:t>
             </a:fld>
             <a:endParaRPr lang="en-US"/>
           </a:p>
@@ -1547,7 +1747,7 @@
           <a:p>
             <a:fld id="{627ED9C8-F09A-4D9E-BEC0-4725162E21FF}" type="datetimeFigureOut">
               <a:rPr lang="en-US" smtClean="0"/>
-              <a:t>2/16/2021</a:t>
+              <a:t>6/2/2024</a:t>
             </a:fld>
             <a:endParaRPr lang="en-US"/>
           </a:p>
@@ -1776,7 +1976,7 @@
           <a:p>
             <a:fld id="{627ED9C8-F09A-4D9E-BEC0-4725162E21FF}" type="datetimeFigureOut">
               <a:rPr lang="en-US" smtClean="0"/>
-              <a:t>2/16/2021</a:t>
+              <a:t>6/2/2024</a:t>
             </a:fld>
             <a:endParaRPr lang="en-US"/>
           </a:p>
@@ -2140,7 +2340,7 @@
           <a:p>
             <a:fld id="{627ED9C8-F09A-4D9E-BEC0-4725162E21FF}" type="datetimeFigureOut">
               <a:rPr lang="en-US" smtClean="0"/>
-              <a:t>2/16/2021</a:t>
+              <a:t>6/2/2024</a:t>
             </a:fld>
             <a:endParaRPr lang="en-US"/>
           </a:p>
@@ -2257,7 +2457,7 @@
           <a:p>
             <a:fld id="{627ED9C8-F09A-4D9E-BEC0-4725162E21FF}" type="datetimeFigureOut">
               <a:rPr lang="en-US" smtClean="0"/>
-              <a:t>2/16/2021</a:t>
+              <a:t>6/2/2024</a:t>
             </a:fld>
             <a:endParaRPr lang="en-US"/>
           </a:p>
@@ -2352,7 +2552,7 @@
           <a:p>
             <a:fld id="{627ED9C8-F09A-4D9E-BEC0-4725162E21FF}" type="datetimeFigureOut">
               <a:rPr lang="en-US" smtClean="0"/>
-              <a:t>2/16/2021</a:t>
+              <a:t>6/2/2024</a:t>
             </a:fld>
             <a:endParaRPr lang="en-US"/>
           </a:p>
@@ -2627,7 +2827,7 @@
           <a:p>
             <a:fld id="{627ED9C8-F09A-4D9E-BEC0-4725162E21FF}" type="datetimeFigureOut">
               <a:rPr lang="en-US" smtClean="0"/>
-              <a:t>2/16/2021</a:t>
+              <a:t>6/2/2024</a:t>
             </a:fld>
             <a:endParaRPr lang="en-US"/>
           </a:p>
@@ -2879,7 +3079,7 @@
           <a:p>
             <a:fld id="{627ED9C8-F09A-4D9E-BEC0-4725162E21FF}" type="datetimeFigureOut">
               <a:rPr lang="en-US" smtClean="0"/>
-              <a:t>2/16/2021</a:t>
+              <a:t>6/2/2024</a:t>
             </a:fld>
             <a:endParaRPr lang="en-US"/>
           </a:p>
@@ -3090,7 +3290,7 @@
           <a:p>
             <a:fld id="{627ED9C8-F09A-4D9E-BEC0-4725162E21FF}" type="datetimeFigureOut">
               <a:rPr lang="en-US" smtClean="0"/>
-              <a:t>2/16/2021</a:t>
+              <a:t>6/2/2024</a:t>
             </a:fld>
             <a:endParaRPr lang="en-US"/>
           </a:p>
@@ -4074,16 +4274,14 @@
       </p:grpSpPr>
       <p:pic>
         <p:nvPicPr>
-          <p:cNvPr id="3" name="Picture" title="This slide contains the following visuals: lineChart, lineChart, lineChart, multiRowCard, Total Delivered, Total Lost Orders, Total Returned, Total Back Ordered, slicer. Please refer to the notes on this slide for details.">
-            <a:hlinkClick r:id="rId3"/>
-          </p:cNvPr>
+          <p:cNvPr id="3" name="Picture" title="This slide contains the following visuals: lineChart, lineChart, lineChart, multiRowCard, Total Delivered, Total Lost Orders, Total Returned, Total Back Ordered, slicer. Please refer to the notes on this slide for details."/>
           <p:cNvPicPr>
             <a:picLocks noChangeAspect="1"/>
           </p:cNvPicPr>
           <p:nvPr/>
         </p:nvPicPr>
         <p:blipFill>
-          <a:blip r:embed="rId4"/>
+          <a:blip r:embed="rId3"/>
           <a:stretch>
             <a:fillRect/>
           </a:stretch>
@@ -4121,6 +4319,242 @@
         </p:txBody>
       </p:sp>
     </p:spTree>
+  </p:cSld>
+  <p:clrMapOvr>
+    <a:masterClrMapping/>
+  </p:clrMapOvr>
+</p:sld>
+</file>
+
+<file path=ppt/slides/slide3.xml><?xml version="1.0" encoding="utf-8"?>
+<p:sld xmlns:a="http://schemas.openxmlformats.org/drawingml/2006/main" xmlns:r="http://schemas.openxmlformats.org/officeDocument/2006/relationships" xmlns:p="http://schemas.openxmlformats.org/presentationml/2006/main">
+  <p:cSld>
+    <p:spTree>
+      <p:nvGrpSpPr>
+        <p:cNvPr id="1" name=""/>
+        <p:cNvGrpSpPr/>
+        <p:nvPr/>
+      </p:nvGrpSpPr>
+      <p:grpSpPr>
+        <a:xfrm>
+          <a:off x="0" y="0"/>
+          <a:ext cx="0" cy="0"/>
+          <a:chOff x="0" y="0"/>
+          <a:chExt cx="0" cy="0"/>
+        </a:xfrm>
+      </p:grpSpPr>
+      <p:pic>
+        <p:nvPicPr>
+          <p:cNvPr id="3" name="Picture" title="This slide contains the following visuals: lineChart, lineChart, lineChart, multiRowCard, Total Delivered, Total Lost Orders, Total Returned, Total Back Ordered, slicer. Please refer to the notes on this slide for details."/>
+          <p:cNvPicPr>
+            <a:picLocks noChangeAspect="1"/>
+          </p:cNvPicPr>
+          <p:nvPr/>
+        </p:nvPicPr>
+        <p:blipFill>
+          <a:blip r:embed="rId3"/>
+          <a:stretch>
+            <a:fillRect/>
+          </a:stretch>
+        </p:blipFill>
+        <p:spPr>
+          <a:xfrm>
+            <a:off x="76200" y="0"/>
+            <a:ext cx="12020550" cy="6858000"/>
+          </a:xfrm>
+          <a:prstGeom prst="rect">
+            <a:avLst/>
+          </a:prstGeom>
+          <a:noFill/>
+        </p:spPr>
+      </p:pic>
+      <p:sp>
+        <p:nvSpPr>
+          <p:cNvPr id="4" name="Title" hidden="1"/>
+          <p:cNvSpPr>
+            <a:spLocks noGrp="1"/>
+          </p:cNvSpPr>
+          <p:nvPr>
+            <p:ph type="title"/>
+          </p:nvPr>
+        </p:nvSpPr>
+        <p:spPr/>
+        <p:txBody>
+          <a:bodyPr/>
+          <a:lstStyle/>
+          <a:p>
+            <a:r>
+              <a:t>Sales Dashboard</a:t>
+            </a:r>
+          </a:p>
+        </p:txBody>
+      </p:sp>
+      <p:sp>
+        <p:nvSpPr>
+          <p:cNvPr id="2" name="Rectangle 1">
+            <a:extLst>
+              <a:ext uri="{FF2B5EF4-FFF2-40B4-BE49-F238E27FC236}">
+                <a16:creationId xmlns:a16="http://schemas.microsoft.com/office/drawing/2014/main" id="{8A19345A-56A7-774E-BEEF-B7FFBA90E31A}"/>
+              </a:ext>
+            </a:extLst>
+          </p:cNvPr>
+          <p:cNvSpPr/>
+          <p:nvPr/>
+        </p:nvSpPr>
+        <p:spPr>
+          <a:xfrm>
+            <a:off x="0" y="0"/>
+            <a:ext cx="10004612" cy="6858000"/>
+          </a:xfrm>
+          <a:prstGeom prst="rect">
+            <a:avLst/>
+          </a:prstGeom>
+          <a:solidFill>
+            <a:schemeClr val="accent1">
+              <a:alpha val="57000"/>
+            </a:schemeClr>
+          </a:solidFill>
+        </p:spPr>
+        <p:style>
+          <a:lnRef idx="2">
+            <a:schemeClr val="accent1">
+              <a:shade val="15000"/>
+            </a:schemeClr>
+          </a:lnRef>
+          <a:fillRef idx="1">
+            <a:schemeClr val="accent1"/>
+          </a:fillRef>
+          <a:effectRef idx="0">
+            <a:schemeClr val="accent1"/>
+          </a:effectRef>
+          <a:fontRef idx="minor">
+            <a:schemeClr val="lt1"/>
+          </a:fontRef>
+        </p:style>
+        <p:txBody>
+          <a:bodyPr rtlCol="0" anchor="ctr"/>
+          <a:lstStyle/>
+          <a:p>
+            <a:pPr algn="ctr"/>
+            <a:endParaRPr lang="en-GB" dirty="0"/>
+          </a:p>
+        </p:txBody>
+      </p:sp>
+      <p:pic>
+        <p:nvPicPr>
+          <p:cNvPr id="5" name="Picture" title="This slide contains the following visuals: lineChart, lineChart, lineChart, multiRowCard, Total Delivered, Total Lost Orders, Total Returned, Total Back Ordered, slicer. Please refer to the notes on this slide for details.">
+            <a:extLst>
+              <a:ext uri="{FF2B5EF4-FFF2-40B4-BE49-F238E27FC236}">
+                <a16:creationId xmlns:a16="http://schemas.microsoft.com/office/drawing/2014/main" id="{C9348659-7285-FAFF-F6CE-28509A076D75}"/>
+              </a:ext>
+            </a:extLst>
+          </p:cNvPr>
+          <p:cNvPicPr>
+            <a:picLocks noChangeAspect="1"/>
+          </p:cNvPicPr>
+          <p:nvPr/>
+        </p:nvPicPr>
+        <p:blipFill rotWithShape="1">
+          <a:blip r:embed="rId3"/>
+          <a:srcRect l="81327" b="62587"/>
+          <a:stretch/>
+        </p:blipFill>
+        <p:spPr>
+          <a:xfrm>
+            <a:off x="3653916" y="1864290"/>
+            <a:ext cx="2796987" cy="3129420"/>
+          </a:xfrm>
+          <a:prstGeom prst="rect">
+            <a:avLst/>
+          </a:prstGeom>
+          <a:noFill/>
+        </p:spPr>
+      </p:pic>
+      <p:cxnSp>
+        <p:nvCxnSpPr>
+          <p:cNvPr id="7" name="Straight Arrow Connector 6">
+            <a:extLst>
+              <a:ext uri="{FF2B5EF4-FFF2-40B4-BE49-F238E27FC236}">
+                <a16:creationId xmlns:a16="http://schemas.microsoft.com/office/drawing/2014/main" id="{D5DE6FE0-DBB1-796F-F865-EBFEA73A9E74}"/>
+              </a:ext>
+            </a:extLst>
+          </p:cNvPr>
+          <p:cNvCxnSpPr>
+            <a:cxnSpLocks/>
+          </p:cNvCxnSpPr>
+          <p:nvPr/>
+        </p:nvCxnSpPr>
+        <p:spPr>
+          <a:xfrm flipV="1">
+            <a:off x="6450903" y="2057400"/>
+            <a:ext cx="3553709" cy="1564710"/>
+          </a:xfrm>
+          <a:prstGeom prst="straightConnector1">
+            <a:avLst/>
+          </a:prstGeom>
+          <a:ln>
+            <a:headEnd type="triangle"/>
+            <a:tailEnd type="triangle"/>
+          </a:ln>
+        </p:spPr>
+        <p:style>
+          <a:lnRef idx="2">
+            <a:schemeClr val="dk1"/>
+          </a:lnRef>
+          <a:fillRef idx="0">
+            <a:schemeClr val="dk1"/>
+          </a:fillRef>
+          <a:effectRef idx="1">
+            <a:schemeClr val="dk1"/>
+          </a:effectRef>
+          <a:fontRef idx="minor">
+            <a:schemeClr val="tx1"/>
+          </a:fontRef>
+        </p:style>
+      </p:cxnSp>
+      <p:sp>
+        <p:nvSpPr>
+          <p:cNvPr id="10" name="TextBox 9">
+            <a:extLst>
+              <a:ext uri="{FF2B5EF4-FFF2-40B4-BE49-F238E27FC236}">
+                <a16:creationId xmlns:a16="http://schemas.microsoft.com/office/drawing/2014/main" id="{35E62806-027E-1A71-1C83-B100DFEC7D11}"/>
+              </a:ext>
+            </a:extLst>
+          </p:cNvPr>
+          <p:cNvSpPr txBox="1"/>
+          <p:nvPr/>
+        </p:nvSpPr>
+        <p:spPr>
+          <a:xfrm>
+            <a:off x="4070959" y="5186820"/>
+            <a:ext cx="4647156" cy="1077218"/>
+          </a:xfrm>
+          <a:prstGeom prst="rect">
+            <a:avLst/>
+          </a:prstGeom>
+          <a:noFill/>
+        </p:spPr>
+        <p:txBody>
+          <a:bodyPr wrap="square" rtlCol="0">
+            <a:spAutoFit/>
+          </a:bodyPr>
+          <a:lstStyle/>
+          <a:p>
+            <a:pPr algn="ctr"/>
+            <a:r>
+              <a:rPr lang="en-US" sz="3200" b="1" dirty="0"/>
+              <a:t>You can filter by each month</a:t>
+            </a:r>
+            <a:endParaRPr lang="en-GB" sz="3200" b="1" dirty="0"/>
+          </a:p>
+        </p:txBody>
+      </p:sp>
+    </p:spTree>
+    <p:extLst>
+      <p:ext uri="{BB962C8B-B14F-4D97-AF65-F5344CB8AC3E}">
+        <p14:creationId xmlns:p14="http://schemas.microsoft.com/office/powerpoint/2010/main" val="3851313205"/>
+      </p:ext>
+    </p:extLst>
   </p:cSld>
   <p:clrMapOvr>
     <a:masterClrMapping/>

</xml_diff>